<commit_message>
Add more tests for adjustments getter
</commit_message>
<xml_diff>
--- a/test/ShapeCrawler.Tests.Unit/Assets/062_shape-adjustments.pptx
+++ b/test/ShapeCrawler.Tests.Unit/Assets/062_shape-adjustments.pptx
@@ -271,7 +271,7 @@
           <a:p>
             <a:fld id="{53089F5D-E3AD-460A-A6BD-884631EC2E46}" type="datetimeFigureOut">
               <a:rPr lang="en-US" smtClean="0"/>
-              <a:t>12/24/2024</a:t>
+              <a:t>1/8/2025</a:t>
             </a:fld>
             <a:endParaRPr lang="en-US"/>
           </a:p>
@@ -469,7 +469,7 @@
           <a:p>
             <a:fld id="{53089F5D-E3AD-460A-A6BD-884631EC2E46}" type="datetimeFigureOut">
               <a:rPr lang="en-US" smtClean="0"/>
-              <a:t>12/24/2024</a:t>
+              <a:t>1/8/2025</a:t>
             </a:fld>
             <a:endParaRPr lang="en-US"/>
           </a:p>
@@ -677,7 +677,7 @@
           <a:p>
             <a:fld id="{53089F5D-E3AD-460A-A6BD-884631EC2E46}" type="datetimeFigureOut">
               <a:rPr lang="en-US" smtClean="0"/>
-              <a:t>12/24/2024</a:t>
+              <a:t>1/8/2025</a:t>
             </a:fld>
             <a:endParaRPr lang="en-US"/>
           </a:p>
@@ -875,7 +875,7 @@
           <a:p>
             <a:fld id="{53089F5D-E3AD-460A-A6BD-884631EC2E46}" type="datetimeFigureOut">
               <a:rPr lang="en-US" smtClean="0"/>
-              <a:t>12/24/2024</a:t>
+              <a:t>1/8/2025</a:t>
             </a:fld>
             <a:endParaRPr lang="en-US"/>
           </a:p>
@@ -1150,7 +1150,7 @@
           <a:p>
             <a:fld id="{53089F5D-E3AD-460A-A6BD-884631EC2E46}" type="datetimeFigureOut">
               <a:rPr lang="en-US" smtClean="0"/>
-              <a:t>12/24/2024</a:t>
+              <a:t>1/8/2025</a:t>
             </a:fld>
             <a:endParaRPr lang="en-US"/>
           </a:p>
@@ -1415,7 +1415,7 @@
           <a:p>
             <a:fld id="{53089F5D-E3AD-460A-A6BD-884631EC2E46}" type="datetimeFigureOut">
               <a:rPr lang="en-US" smtClean="0"/>
-              <a:t>12/24/2024</a:t>
+              <a:t>1/8/2025</a:t>
             </a:fld>
             <a:endParaRPr lang="en-US"/>
           </a:p>
@@ -1827,7 +1827,7 @@
           <a:p>
             <a:fld id="{53089F5D-E3AD-460A-A6BD-884631EC2E46}" type="datetimeFigureOut">
               <a:rPr lang="en-US" smtClean="0"/>
-              <a:t>12/24/2024</a:t>
+              <a:t>1/8/2025</a:t>
             </a:fld>
             <a:endParaRPr lang="en-US"/>
           </a:p>
@@ -1968,7 +1968,7 @@
           <a:p>
             <a:fld id="{53089F5D-E3AD-460A-A6BD-884631EC2E46}" type="datetimeFigureOut">
               <a:rPr lang="en-US" smtClean="0"/>
-              <a:t>12/24/2024</a:t>
+              <a:t>1/8/2025</a:t>
             </a:fld>
             <a:endParaRPr lang="en-US"/>
           </a:p>
@@ -2081,7 +2081,7 @@
           <a:p>
             <a:fld id="{53089F5D-E3AD-460A-A6BD-884631EC2E46}" type="datetimeFigureOut">
               <a:rPr lang="en-US" smtClean="0"/>
-              <a:t>12/24/2024</a:t>
+              <a:t>1/8/2025</a:t>
             </a:fld>
             <a:endParaRPr lang="en-US"/>
           </a:p>
@@ -2392,7 +2392,7 @@
           <a:p>
             <a:fld id="{53089F5D-E3AD-460A-A6BD-884631EC2E46}" type="datetimeFigureOut">
               <a:rPr lang="en-US" smtClean="0"/>
-              <a:t>12/24/2024</a:t>
+              <a:t>1/8/2025</a:t>
             </a:fld>
             <a:endParaRPr lang="en-US"/>
           </a:p>
@@ -2680,7 +2680,7 @@
           <a:p>
             <a:fld id="{53089F5D-E3AD-460A-A6BD-884631EC2E46}" type="datetimeFigureOut">
               <a:rPr lang="en-US" smtClean="0"/>
-              <a:t>12/24/2024</a:t>
+              <a:t>1/8/2025</a:t>
             </a:fld>
             <a:endParaRPr lang="en-US"/>
           </a:p>
@@ -2921,7 +2921,7 @@
           <a:p>
             <a:fld id="{53089F5D-E3AD-460A-A6BD-884631EC2E46}" type="datetimeFigureOut">
               <a:rPr lang="en-US" smtClean="0"/>
-              <a:t>12/24/2024</a:t>
+              <a:t>1/8/2025</a:t>
             </a:fld>
             <a:endParaRPr lang="en-US"/>
           </a:p>
@@ -5174,7 +5174,7 @@
               <a:rPr lang="en-US" sz="1400" dirty="0"/>
               <a:t>DownArrow</a:t>
             </a:r>
-            <a:endParaRPr lang="en-US"/>
+            <a:endParaRPr lang="en-US" dirty="0"/>
           </a:p>
         </p:txBody>
       </p:sp>
@@ -5462,7 +5462,11 @@
             <a:ext cx="914400" cy="914400"/>
           </a:xfrm>
           <a:prstGeom prst="leftUpArrow">
-            <a:avLst/>
+            <a:avLst>
+              <a:gd name="adj1" fmla="val 5281"/>
+              <a:gd name="adj2" fmla="val 35211"/>
+              <a:gd name="adj3" fmla="val 29578"/>
+            </a:avLst>
           </a:prstGeom>
         </p:spPr>
         <p:style>
@@ -5512,7 +5516,11 @@
             <a:ext cx="914400" cy="914400"/>
           </a:xfrm>
           <a:prstGeom prst="leftRightUpArrow">
-            <a:avLst/>
+            <a:avLst>
+              <a:gd name="adj1" fmla="val 0"/>
+              <a:gd name="adj2" fmla="val 10211"/>
+              <a:gd name="adj3" fmla="val 25000"/>
+            </a:avLst>
           </a:prstGeom>
         </p:spPr>
         <p:style>
@@ -5562,7 +5570,11 @@
             <a:ext cx="914400" cy="914400"/>
           </a:xfrm>
           <a:prstGeom prst="quadArrow">
-            <a:avLst/>
+            <a:avLst>
+              <a:gd name="adj1" fmla="val 4190"/>
+              <a:gd name="adj2" fmla="val 37993"/>
+              <a:gd name="adj3" fmla="val 0"/>
+            </a:avLst>
           </a:prstGeom>
         </p:spPr>
         <p:style>
@@ -5612,7 +5624,12 @@
             <a:ext cx="914400" cy="914400"/>
           </a:xfrm>
           <a:prstGeom prst="leftArrowCallout">
-            <a:avLst/>
+            <a:avLst>
+              <a:gd name="adj1" fmla="val 0"/>
+              <a:gd name="adj2" fmla="val 24296"/>
+              <a:gd name="adj3" fmla="val 28521"/>
+              <a:gd name="adj4" fmla="val 7394"/>
+            </a:avLst>
           </a:prstGeom>
         </p:spPr>
         <p:style>
@@ -5662,7 +5679,12 @@
             <a:ext cx="914400" cy="914400"/>
           </a:xfrm>
           <a:prstGeom prst="rightArrowCallout">
-            <a:avLst/>
+            <a:avLst>
+              <a:gd name="adj1" fmla="val 25000"/>
+              <a:gd name="adj2" fmla="val 13028"/>
+              <a:gd name="adj3" fmla="val 39789"/>
+              <a:gd name="adj4" fmla="val 38217"/>
+            </a:avLst>
           </a:prstGeom>
         </p:spPr>
         <p:style>
@@ -5840,7 +5862,7 @@
               <a:rPr lang="en-US" sz="1400" dirty="0"/>
               <a:t>LeftRightArrowCallout</a:t>
             </a:r>
-            <a:endParaRPr lang="en-US"/>
+            <a:endParaRPr lang="en-US" dirty="0"/>
           </a:p>
         </p:txBody>
       </p:sp>

</xml_diff>

<commit_message>
Add more geometry types to adjustments getter
</commit_message>
<xml_diff>
--- a/test/ShapeCrawler.Tests.Unit/Assets/062_shape-adjustments.pptx
+++ b/test/ShapeCrawler.Tests.Unit/Assets/062_shape-adjustments.pptx
@@ -271,7 +271,7 @@
           <a:p>
             <a:fld id="{53089F5D-E3AD-460A-A6BD-884631EC2E46}" type="datetimeFigureOut">
               <a:rPr lang="en-US" smtClean="0"/>
-              <a:t>1/8/2025</a:t>
+              <a:t>1/22/2025</a:t>
             </a:fld>
             <a:endParaRPr lang="en-US"/>
           </a:p>
@@ -469,7 +469,7 @@
           <a:p>
             <a:fld id="{53089F5D-E3AD-460A-A6BD-884631EC2E46}" type="datetimeFigureOut">
               <a:rPr lang="en-US" smtClean="0"/>
-              <a:t>1/8/2025</a:t>
+              <a:t>1/22/2025</a:t>
             </a:fld>
             <a:endParaRPr lang="en-US"/>
           </a:p>
@@ -677,7 +677,7 @@
           <a:p>
             <a:fld id="{53089F5D-E3AD-460A-A6BD-884631EC2E46}" type="datetimeFigureOut">
               <a:rPr lang="en-US" smtClean="0"/>
-              <a:t>1/8/2025</a:t>
+              <a:t>1/22/2025</a:t>
             </a:fld>
             <a:endParaRPr lang="en-US"/>
           </a:p>
@@ -875,7 +875,7 @@
           <a:p>
             <a:fld id="{53089F5D-E3AD-460A-A6BD-884631EC2E46}" type="datetimeFigureOut">
               <a:rPr lang="en-US" smtClean="0"/>
-              <a:t>1/8/2025</a:t>
+              <a:t>1/22/2025</a:t>
             </a:fld>
             <a:endParaRPr lang="en-US"/>
           </a:p>
@@ -1150,7 +1150,7 @@
           <a:p>
             <a:fld id="{53089F5D-E3AD-460A-A6BD-884631EC2E46}" type="datetimeFigureOut">
               <a:rPr lang="en-US" smtClean="0"/>
-              <a:t>1/8/2025</a:t>
+              <a:t>1/22/2025</a:t>
             </a:fld>
             <a:endParaRPr lang="en-US"/>
           </a:p>
@@ -1415,7 +1415,7 @@
           <a:p>
             <a:fld id="{53089F5D-E3AD-460A-A6BD-884631EC2E46}" type="datetimeFigureOut">
               <a:rPr lang="en-US" smtClean="0"/>
-              <a:t>1/8/2025</a:t>
+              <a:t>1/22/2025</a:t>
             </a:fld>
             <a:endParaRPr lang="en-US"/>
           </a:p>
@@ -1827,7 +1827,7 @@
           <a:p>
             <a:fld id="{53089F5D-E3AD-460A-A6BD-884631EC2E46}" type="datetimeFigureOut">
               <a:rPr lang="en-US" smtClean="0"/>
-              <a:t>1/8/2025</a:t>
+              <a:t>1/22/2025</a:t>
             </a:fld>
             <a:endParaRPr lang="en-US"/>
           </a:p>
@@ -1968,7 +1968,7 @@
           <a:p>
             <a:fld id="{53089F5D-E3AD-460A-A6BD-884631EC2E46}" type="datetimeFigureOut">
               <a:rPr lang="en-US" smtClean="0"/>
-              <a:t>1/8/2025</a:t>
+              <a:t>1/22/2025</a:t>
             </a:fld>
             <a:endParaRPr lang="en-US"/>
           </a:p>
@@ -2081,7 +2081,7 @@
           <a:p>
             <a:fld id="{53089F5D-E3AD-460A-A6BD-884631EC2E46}" type="datetimeFigureOut">
               <a:rPr lang="en-US" smtClean="0"/>
-              <a:t>1/8/2025</a:t>
+              <a:t>1/22/2025</a:t>
             </a:fld>
             <a:endParaRPr lang="en-US"/>
           </a:p>
@@ -2392,7 +2392,7 @@
           <a:p>
             <a:fld id="{53089F5D-E3AD-460A-A6BD-884631EC2E46}" type="datetimeFigureOut">
               <a:rPr lang="en-US" smtClean="0"/>
-              <a:t>1/8/2025</a:t>
+              <a:t>1/22/2025</a:t>
             </a:fld>
             <a:endParaRPr lang="en-US"/>
           </a:p>
@@ -2680,7 +2680,7 @@
           <a:p>
             <a:fld id="{53089F5D-E3AD-460A-A6BD-884631EC2E46}" type="datetimeFigureOut">
               <a:rPr lang="en-US" smtClean="0"/>
-              <a:t>1/8/2025</a:t>
+              <a:t>1/22/2025</a:t>
             </a:fld>
             <a:endParaRPr lang="en-US"/>
           </a:p>
@@ -2921,7 +2921,7 @@
           <a:p>
             <a:fld id="{53089F5D-E3AD-460A-A6BD-884631EC2E46}" type="datetimeFigureOut">
               <a:rPr lang="en-US" smtClean="0"/>
-              <a:t>1/8/2025</a:t>
+              <a:t>1/22/2025</a:t>
             </a:fld>
             <a:endParaRPr lang="en-US"/>
           </a:p>
@@ -5734,7 +5734,12 @@
             <a:ext cx="914400" cy="914400"/>
           </a:xfrm>
           <a:prstGeom prst="upArrowCallout">
-            <a:avLst/>
+            <a:avLst>
+              <a:gd name="adj1" fmla="val 0"/>
+              <a:gd name="adj2" fmla="val 50000"/>
+              <a:gd name="adj3" fmla="val 82747"/>
+              <a:gd name="adj4" fmla="val 7935"/>
+            </a:avLst>
           </a:prstGeom>
         </p:spPr>
         <p:style>
@@ -5784,7 +5789,12 @@
             <a:ext cx="914400" cy="914400"/>
           </a:xfrm>
           <a:prstGeom prst="downArrowCallout">
-            <a:avLst/>
+            <a:avLst>
+              <a:gd name="adj1" fmla="val 0"/>
+              <a:gd name="adj2" fmla="val 50000"/>
+              <a:gd name="adj3" fmla="val 72887"/>
+              <a:gd name="adj4" fmla="val 3005"/>
+            </a:avLst>
           </a:prstGeom>
         </p:spPr>
         <p:style>
@@ -5818,56 +5828,6 @@
       </p:sp>
       <p:sp>
         <p:nvSpPr>
-          <p:cNvPr id="49" name="LeftRightArrowCallout">
-            <a:extLst>
-              <a:ext uri="{FF2B5EF4-FFF2-40B4-BE49-F238E27FC236}">
-                <a16:creationId xmlns:a16="http://schemas.microsoft.com/office/drawing/2014/main" id="{BEBA1AF9-F947-C1C7-AC86-3F703DC6F743}"/>
-              </a:ext>
-            </a:extLst>
-          </p:cNvPr>
-          <p:cNvSpPr/>
-          <p:nvPr/>
-        </p:nvSpPr>
-        <p:spPr>
-          <a:xfrm>
-            <a:off x="6629400" y="3886200"/>
-            <a:ext cx="914400" cy="914400"/>
-          </a:xfrm>
-          <a:prstGeom prst="leftRightArrowCallout">
-            <a:avLst/>
-          </a:prstGeom>
-        </p:spPr>
-        <p:style>
-          <a:lnRef idx="2">
-            <a:schemeClr val="accent1">
-              <a:shade val="15000"/>
-            </a:schemeClr>
-          </a:lnRef>
-          <a:fillRef idx="1">
-            <a:schemeClr val="accent1"/>
-          </a:fillRef>
-          <a:effectRef idx="0">
-            <a:schemeClr val="accent1"/>
-          </a:effectRef>
-          <a:fontRef idx="minor">
-            <a:schemeClr val="lt1"/>
-          </a:fontRef>
-        </p:style>
-        <p:txBody>
-          <a:bodyPr rtlCol="0" anchor="ctr"/>
-          <a:lstStyle/>
-          <a:p>
-            <a:pPr algn="ctr"/>
-            <a:r>
-              <a:rPr lang="en-US" sz="1400" dirty="0"/>
-              <a:t>LeftRightArrowCallout</a:t>
-            </a:r>
-            <a:endParaRPr lang="en-US" dirty="0"/>
-          </a:p>
-        </p:txBody>
-      </p:sp>
-      <p:sp>
-        <p:nvSpPr>
           <p:cNvPr id="50" name="UpDownArrowCallout">
             <a:extLst>
               <a:ext uri="{FF2B5EF4-FFF2-40B4-BE49-F238E27FC236}">
@@ -5884,7 +5844,12 @@
             <a:ext cx="914400" cy="914400"/>
           </a:xfrm>
           <a:prstGeom prst="upDownArrowCallout">
-            <a:avLst/>
+            <a:avLst>
+              <a:gd name="adj1" fmla="val 40845"/>
+              <a:gd name="adj2" fmla="val 50000"/>
+              <a:gd name="adj3" fmla="val 39084"/>
+              <a:gd name="adj4" fmla="val 0"/>
+            </a:avLst>
           </a:prstGeom>
         </p:spPr>
         <p:style>
@@ -5934,7 +5899,12 @@
             <a:ext cx="914400" cy="914400"/>
           </a:xfrm>
           <a:prstGeom prst="quadArrowCallout">
-            <a:avLst/>
+            <a:avLst>
+              <a:gd name="adj1" fmla="val 0"/>
+              <a:gd name="adj2" fmla="val 0"/>
+              <a:gd name="adj3" fmla="val 31485"/>
+              <a:gd name="adj4" fmla="val 0"/>
+            </a:avLst>
           </a:prstGeom>
         </p:spPr>
         <p:style>
@@ -5962,7 +5932,7 @@
               <a:rPr lang="en-US" sz="1400" dirty="0"/>
               <a:t>QuadArrowCallout</a:t>
             </a:r>
-            <a:endParaRPr lang="en-US"/>
+            <a:endParaRPr lang="en-US" dirty="0"/>
           </a:p>
         </p:txBody>
       </p:sp>
@@ -5984,7 +5954,12 @@
             <a:ext cx="914400" cy="914400"/>
           </a:xfrm>
           <a:prstGeom prst="bentArrow">
-            <a:avLst/>
+            <a:avLst>
+              <a:gd name="adj1" fmla="val 30986"/>
+              <a:gd name="adj2" fmla="val 15493"/>
+              <a:gd name="adj3" fmla="val 50000"/>
+              <a:gd name="adj4" fmla="val 0"/>
+            </a:avLst>
           </a:prstGeom>
         </p:spPr>
         <p:style>
@@ -6034,7 +6009,13 @@
             <a:ext cx="914400" cy="914400"/>
           </a:xfrm>
           <a:prstGeom prst="uturnArrow">
-            <a:avLst/>
+            <a:avLst>
+              <a:gd name="adj1" fmla="val 0"/>
+              <a:gd name="adj2" fmla="val 9155"/>
+              <a:gd name="adj3" fmla="val 42606"/>
+              <a:gd name="adj4" fmla="val 2905"/>
+              <a:gd name="adj5" fmla="val 67606"/>
+            </a:avLst>
           </a:prstGeom>
         </p:spPr>
         <p:style>
@@ -6519,9 +6500,9 @@
           </a:xfrm>
           <a:prstGeom prst="curvedDownArrow">
             <a:avLst>
-              <a:gd name="adj1" fmla="val 50000"/>
-              <a:gd name="adj2" fmla="val 0"/>
-              <a:gd name="adj3" fmla="val 0"/>
+              <a:gd name="adj1" fmla="val 14138"/>
+              <a:gd name="adj2" fmla="val 34130"/>
+              <a:gd name="adj3" fmla="val 28761"/>
             </a:avLst>
           </a:prstGeom>
         </p:spPr>

</xml_diff>